<commit_message>
updated slide content with practicals
</commit_message>
<xml_diff>
--- a/lesson06/Classes/Classes.pptx
+++ b/lesson06/Classes/Classes.pptx
@@ -5342,13 +5342,8 @@
           <a:p>
             <a:r>
               <a:rPr lang="en-US" dirty="0"/>
-              <a:t>Build the </a:t>
-            </a:r>
-            <a:r>
-              <a:rPr lang="en-US"/>
-              <a:t>terminal instructions for the game!</a:t>
-            </a:r>
-            <a:endParaRPr lang="en-US" dirty="0"/>
+              <a:t>Build the terminal instructions for the game!</a:t>
+            </a:r>
           </a:p>
         </p:txBody>
       </p:sp>

</xml_diff>